<commit_message>
Hide table of content
</commit_message>
<xml_diff>
--- a/Presentation/Pitch.pptx
+++ b/Presentation/Pitch.pptx
@@ -1759,7 +1759,7 @@
               </a:spcAft>
               <a:buNone/>
             </a:pPr>
-            <a:endParaRPr/>
+            <a:endParaRPr dirty="0"/>
           </a:p>
         </p:txBody>
       </p:sp>
@@ -1977,7 +1977,17 @@
               </a:spcAft>
               <a:buNone/>
             </a:pPr>
-            <a:endParaRPr/>
+            <a:r>
+              <a:rPr lang="de-DE" dirty="0"/>
+              <a:t>Hook mit Maskottchen Giranimo! Sagt Hallo </a:t>
+            </a:r>
+            <a:r>
+              <a:rPr lang="de-DE" dirty="0">
+                <a:sym typeface="Wingdings" panose="05000000000000000000" pitchFamily="2" charset="2"/>
+              </a:rPr>
+              <a:t>! </a:t>
+            </a:r>
+            <a:endParaRPr dirty="0"/>
           </a:p>
         </p:txBody>
       </p:sp>
@@ -2081,7 +2091,40 @@
               </a:spcAft>
               <a:buNone/>
             </a:pPr>
-            <a:endParaRPr/>
+            <a:r>
+              <a:rPr lang="de-DE" dirty="0"/>
+              <a:t>Einmalige Kosten: Apple Development Lizensen, Trailer, Art</a:t>
+            </a:r>
+          </a:p>
+          <a:p>
+            <a:pPr marL="0" lvl="0" indent="0" algn="l" rtl="0">
+              <a:spcBef>
+                <a:spcPts val="0"/>
+              </a:spcBef>
+              <a:spcAft>
+                <a:spcPts val="0"/>
+              </a:spcAft>
+              <a:buNone/>
+            </a:pPr>
+            <a:r>
+              <a:rPr lang="de-DE" dirty="0"/>
+              <a:t>Monatliche Kosten: Persönliche Ausgaben, Werbungen + Puffer</a:t>
+            </a:r>
+          </a:p>
+          <a:p>
+            <a:pPr marL="0" lvl="0" indent="0" algn="l" rtl="0">
+              <a:spcBef>
+                <a:spcPts val="0"/>
+              </a:spcBef>
+              <a:spcAft>
+                <a:spcPts val="0"/>
+              </a:spcAft>
+              <a:buNone/>
+            </a:pPr>
+            <a:r>
+              <a:rPr lang="de-DE" dirty="0"/>
+              <a:t>Monatliche Einnahmen: Durch das Spiel</a:t>
+            </a:r>
           </a:p>
         </p:txBody>
       </p:sp>
@@ -2517,7 +2560,11 @@
               </a:spcAft>
               <a:buNone/>
             </a:pPr>
-            <a:endParaRPr/>
+            <a:r>
+              <a:rPr lang="de-DE" dirty="0"/>
+              <a:t>Kommt nicht in der Präsentation dran. Nur für uns!</a:t>
+            </a:r>
+            <a:endParaRPr dirty="0"/>
           </a:p>
         </p:txBody>
       </p:sp>
@@ -2735,7 +2782,7 @@
               </a:spcAft>
               <a:buNone/>
             </a:pPr>
-            <a:endParaRPr/>
+            <a:endParaRPr dirty="0"/>
           </a:p>
         </p:txBody>
       </p:sp>
@@ -2835,19 +2882,52 @@
           </a:bodyPr>
           <a:lstStyle/>
           <a:p>
-            <a:pPr marL="0" lvl="0" indent="0" algn="l" rtl="0">
-              <a:spcBef>
-                <a:spcPts val="0"/>
-              </a:spcBef>
-              <a:spcAft>
-                <a:spcPts val="0"/>
-              </a:spcAft>
-              <a:buNone/>
+            <a:pPr marL="0" marR="0" lvl="0" indent="0" algn="l" defTabSz="914400" rtl="0" eaLnBrk="1" fontAlgn="auto" latinLnBrk="0" hangingPunct="1">
+              <a:lnSpc>
+                <a:spcPct val="100000"/>
+              </a:lnSpc>
+              <a:spcBef>
+                <a:spcPts val="0"/>
+              </a:spcBef>
+              <a:spcAft>
+                <a:spcPts val="0"/>
+              </a:spcAft>
+              <a:buClr>
+                <a:srgbClr val="000000"/>
+              </a:buClr>
+              <a:buSzPts val="1400"/>
+              <a:buFont typeface="Arial"/>
+              <a:buNone/>
+              <a:tabLst/>
+              <a:defRPr/>
             </a:pPr>
             <a:r>
               <a:rPr lang="de-DE" dirty="0"/>
-              <a:t>Story Outline</a:t>
+              <a:t>Story Outline: „</a:t>
             </a:r>
+            <a:r>
+              <a:rPr lang="de-DE" sz="1100" b="0" i="0" u="none" strike="noStrike" cap="none" dirty="0">
+                <a:solidFill>
+                  <a:srgbClr val="000000"/>
+                </a:solidFill>
+                <a:effectLst/>
+                <a:latin typeface="Arial"/>
+                <a:ea typeface="Arial"/>
+                <a:cs typeface="Arial"/>
+                <a:sym typeface="Arial"/>
+              </a:rPr>
+              <a:t>Eine kleine Giraffe namens Giranimo erfreut sich am kühlem Wasser in einer lauen Sommernacht. Als sie in den klaren Himmel aufblickt und die funkelnden Sterne sieht, fragt sie sich, wie wohl die Sterne und der Mond schmecken würden. Aus Neugier streckt sie ihren Hals und verzehrt dabei einen Apfel der an einem Baum hängt. Überraschenderweise wächst ihr Hals mit einem Schub in die Höhe. Ob es denn möglich ist, dass Giranimo bis zu den Sternen wächst? „</a:t>
+            </a:r>
+            <a:endParaRPr lang="en-US" sz="1100" b="0" i="0" u="none" strike="noStrike" cap="none" dirty="0">
+              <a:solidFill>
+                <a:srgbClr val="000000"/>
+              </a:solidFill>
+              <a:effectLst/>
+              <a:latin typeface="Arial"/>
+              <a:ea typeface="Arial"/>
+              <a:cs typeface="Arial"/>
+              <a:sym typeface="Arial"/>
+            </a:endParaRPr>
           </a:p>
         </p:txBody>
       </p:sp>
@@ -2956,7 +3036,7 @@
               </a:spcAft>
               <a:buNone/>
             </a:pPr>
-            <a:endParaRPr/>
+            <a:endParaRPr dirty="0"/>
           </a:p>
         </p:txBody>
       </p:sp>
@@ -8453,8 +8533,8 @@
         </p:nvSpPr>
         <p:spPr>
           <a:xfrm>
-            <a:off x="3361764" y="4504765"/>
-            <a:ext cx="4182036" cy="307777"/>
+            <a:off x="2373406" y="4502150"/>
+            <a:ext cx="4463314" cy="307777"/>
           </a:xfrm>
           <a:prstGeom prst="rect">
             <a:avLst/>
@@ -8474,7 +8554,7 @@
                 </a:solidFill>
                 <a:latin typeface="Montserrat" panose="020B0604020202020204" charset="0"/>
               </a:rPr>
-              <a:t>James Li, Markus Gumbart, Martina</a:t>
+              <a:t>James Li, Markus Gumbart, Martina Hermsdorf</a:t>
             </a:r>
             <a:endParaRPr lang="en-US" dirty="0">
               <a:solidFill>
@@ -8535,7 +8615,7 @@
         </p:blipFill>
         <p:spPr>
           <a:xfrm>
-            <a:off x="5452782" y="2574365"/>
+            <a:off x="5089711" y="2672603"/>
             <a:ext cx="1930400" cy="1930400"/>
           </a:xfrm>
           <a:prstGeom prst="rect">
@@ -8604,8 +8684,8 @@
               <a:buNone/>
             </a:pPr>
             <a:r>
-              <a:rPr lang="en" dirty="0"/>
-              <a:t>Zielgruppe</a:t>
+              <a:rPr lang="en-US" dirty="0"/>
+              <a:t>Target Audience</a:t>
             </a:r>
             <a:endParaRPr dirty="0"/>
           </a:p>
@@ -8647,7 +8727,7 @@
             </a:pPr>
             <a:r>
               <a:rPr lang="de-DE" sz="2400" dirty="0"/>
-              <a:t>Jede Altersgruppe</a:t>
+              <a:t>For all ages</a:t>
             </a:r>
           </a:p>
           <a:p>
@@ -8663,12 +8743,18 @@
             <a:endParaRPr lang="de-DE" sz="2400" dirty="0"/>
           </a:p>
           <a:p>
-            <a:pPr marL="0" lvl="0" indent="0">
+            <a:pPr marL="0" lvl="0" indent="0" algn="l" rtl="0">
+              <a:spcBef>
+                <a:spcPts val="600"/>
+              </a:spcBef>
+              <a:spcAft>
+                <a:spcPts val="0"/>
+              </a:spcAft>
               <a:buNone/>
             </a:pPr>
             <a:r>
               <a:rPr lang="de-DE" sz="2400" dirty="0"/>
-              <a:t>Spiel für Zwischendurch</a:t>
+              <a:t>Game for in between</a:t>
             </a:r>
           </a:p>
           <a:p>
@@ -8695,7 +8781,7 @@
             </a:pPr>
             <a:r>
               <a:rPr lang="de-DE" sz="2400" dirty="0"/>
-              <a:t>Herausforderung suchend !</a:t>
+              <a:t>Challenging !</a:t>
             </a:r>
             <a:endParaRPr sz="2400" dirty="0"/>
           </a:p>
@@ -8829,7 +8915,7 @@
         <p:spPr>
           <a:xfrm>
             <a:off x="457200" y="447620"/>
-            <a:ext cx="4188759" cy="1071900"/>
+            <a:ext cx="4625340" cy="1071900"/>
           </a:xfrm>
           <a:prstGeom prst="rect">
             <a:avLst/>
@@ -8851,12 +8937,8 @@
               <a:buNone/>
             </a:pPr>
             <a:r>
-              <a:rPr lang="en-US" dirty="0" err="1"/>
-              <a:t>Zielplattform</a:t>
-            </a:r>
-            <a:r>
               <a:rPr lang="en-US" dirty="0"/>
-              <a:t>: IOS</a:t>
+              <a:t>Target platform: IOS</a:t>
             </a:r>
             <a:endParaRPr dirty="0"/>
           </a:p>
@@ -8894,7 +8976,7 @@
             </a:pPr>
             <a:r>
               <a:rPr lang="de-DE" sz="2400" dirty="0"/>
-              <a:t>Infrastruktur für Developer</a:t>
+              <a:t>Infrastructure for Developer</a:t>
             </a:r>
           </a:p>
           <a:p>
@@ -8913,7 +8995,7 @@
             </a:pPr>
             <a:r>
               <a:rPr lang="de-DE" sz="2400" dirty="0"/>
-              <a:t>Weniger Komplikationen mit unterschiedlichen Versionen</a:t>
+              <a:t>Less complications with System versions</a:t>
             </a:r>
           </a:p>
           <a:p>
@@ -9635,7 +9717,23 @@
                   <a:srgbClr val="FFC800"/>
                 </a:solidFill>
               </a:rPr>
-              <a:t>Humor</a:t>
+              <a:t>Humo</a:t>
+            </a:r>
+            <a:r>
+              <a:rPr lang="en-US" sz="6000" dirty="0">
+                <a:solidFill>
+                  <a:srgbClr val="FFC800"/>
+                </a:solidFill>
+              </a:rPr>
+              <a:t>u</a:t>
+            </a:r>
+            <a:r>
+              <a:rPr lang="en" sz="6000" dirty="0">
+                <a:solidFill>
+                  <a:srgbClr val="FFC800"/>
+                </a:solidFill>
+              </a:rPr>
+              <a:t>r</a:t>
             </a:r>
             <a:endParaRPr sz="6000" dirty="0">
               <a:solidFill>
@@ -9670,18 +9768,12 @@
           </a:bodyPr>
           <a:lstStyle/>
           <a:p>
-            <a:pPr marL="0" lvl="0" indent="0" algn="ctr" rtl="0">
-              <a:spcBef>
-                <a:spcPts val="600"/>
-              </a:spcBef>
-              <a:spcAft>
-                <a:spcPts val="0"/>
-              </a:spcAft>
+            <a:pPr marL="0" lvl="0" indent="0" algn="ctr">
               <a:buNone/>
             </a:pPr>
             <a:r>
               <a:rPr lang="en" dirty="0"/>
-              <a:t>“You literally can eat everything you see”</a:t>
+              <a:t>“You can literally eat everything you see”</a:t>
             </a:r>
             <a:endParaRPr dirty="0"/>
           </a:p>
@@ -10631,7 +10723,7 @@
 </file>
 
 <file path=ppt/slides/slide16.xml><?xml version="1.0" encoding="utf-8"?>
-<p:sld xmlns:a="http://schemas.openxmlformats.org/drawingml/2006/main" xmlns:r="http://schemas.openxmlformats.org/officeDocument/2006/relationships" xmlns:p="http://schemas.openxmlformats.org/presentationml/2006/main">
+<p:sld xmlns:a="http://schemas.openxmlformats.org/drawingml/2006/main" xmlns:r="http://schemas.openxmlformats.org/officeDocument/2006/relationships" xmlns:p="http://schemas.openxmlformats.org/presentationml/2006/main" show="0">
   <p:cSld>
     <p:spTree>
       <p:nvGrpSpPr>
@@ -10707,7 +10799,7 @@
             </a:pPr>
             <a:r>
               <a:rPr lang="en-US" dirty="0" err="1"/>
-              <a:t>Planung</a:t>
+              <a:t>Planing</a:t>
             </a:r>
             <a:endParaRPr dirty="0"/>
           </a:p>
@@ -10854,7 +10946,7 @@
             </a:pPr>
             <a:r>
               <a:rPr lang="de-DE" dirty="0"/>
-              <a:t>Projektplan</a:t>
+              <a:t>Project Plan</a:t>
             </a:r>
             <a:endParaRPr dirty="0"/>
           </a:p>
@@ -11664,7 +11756,7 @@
             </a:pPr>
             <a:r>
               <a:rPr lang="de-DE" sz="3000" dirty="0"/>
-              <a:t>Risikoanalyse</a:t>
+              <a:t>Risk Analysis</a:t>
             </a:r>
             <a:endParaRPr sz="3000" dirty="0"/>
           </a:p>
@@ -11762,7 +11854,7 @@
                 <a:cs typeface="Montserrat"/>
                 <a:sym typeface="Montserrat"/>
               </a:rPr>
-              <a:t>Starke Konkurrenz</a:t>
+              <a:t>Strong Competition</a:t>
             </a:r>
             <a:endParaRPr dirty="0">
               <a:solidFill>
@@ -11814,20 +11906,19 @@
                 <a:cs typeface="Open Sans"/>
                 <a:sym typeface="Open Sans"/>
               </a:rPr>
-              <a:t>Mobile Game </a:t>
+              <a:t>Mobile Game market is big!</a:t>
             </a:r>
-            <a:r>
-              <a:rPr lang="en-US" sz="1200" dirty="0" err="1">
-                <a:solidFill>
-                  <a:srgbClr val="FFFFFF"/>
-                </a:solidFill>
-                <a:latin typeface="Open Sans"/>
-                <a:ea typeface="Open Sans"/>
-                <a:cs typeface="Open Sans"/>
-                <a:sym typeface="Open Sans"/>
-              </a:rPr>
-              <a:t>Markt</a:t>
-            </a:r>
+          </a:p>
+          <a:p>
+            <a:pPr marL="0" marR="0" lvl="0" indent="0" algn="l" rtl="0">
+              <a:spcBef>
+                <a:spcPts val="0"/>
+              </a:spcBef>
+              <a:spcAft>
+                <a:spcPts val="0"/>
+              </a:spcAft>
+              <a:buNone/>
+            </a:pPr>
             <a:r>
               <a:rPr lang="en-US" sz="1200" dirty="0">
                 <a:solidFill>
@@ -11838,111 +11929,7 @@
                 <a:cs typeface="Open Sans"/>
                 <a:sym typeface="Open Sans"/>
               </a:rPr>
-              <a:t> </a:t>
-            </a:r>
-            <a:r>
-              <a:rPr lang="en-US" sz="1200" dirty="0" err="1">
-                <a:solidFill>
-                  <a:srgbClr val="FFFFFF"/>
-                </a:solidFill>
-                <a:latin typeface="Open Sans"/>
-                <a:ea typeface="Open Sans"/>
-                <a:cs typeface="Open Sans"/>
-                <a:sym typeface="Open Sans"/>
-              </a:rPr>
-              <a:t>ist</a:t>
-            </a:r>
-            <a:r>
-              <a:rPr lang="en-US" sz="1200" dirty="0">
-                <a:solidFill>
-                  <a:srgbClr val="FFFFFF"/>
-                </a:solidFill>
-                <a:latin typeface="Open Sans"/>
-                <a:ea typeface="Open Sans"/>
-                <a:cs typeface="Open Sans"/>
-                <a:sym typeface="Open Sans"/>
-              </a:rPr>
-              <a:t> </a:t>
-            </a:r>
-            <a:r>
-              <a:rPr lang="en-US" sz="1200" dirty="0" err="1">
-                <a:solidFill>
-                  <a:srgbClr val="FFFFFF"/>
-                </a:solidFill>
-                <a:latin typeface="Open Sans"/>
-                <a:ea typeface="Open Sans"/>
-                <a:cs typeface="Open Sans"/>
-                <a:sym typeface="Open Sans"/>
-              </a:rPr>
-              <a:t>zu</a:t>
-            </a:r>
-            <a:r>
-              <a:rPr lang="en-US" sz="1200" dirty="0">
-                <a:solidFill>
-                  <a:srgbClr val="FFFFFF"/>
-                </a:solidFill>
-                <a:latin typeface="Open Sans"/>
-                <a:ea typeface="Open Sans"/>
-                <a:cs typeface="Open Sans"/>
-                <a:sym typeface="Open Sans"/>
-              </a:rPr>
-              <a:t> </a:t>
-            </a:r>
-            <a:r>
-              <a:rPr lang="en-US" sz="1200" dirty="0" err="1">
-                <a:solidFill>
-                  <a:srgbClr val="FFFFFF"/>
-                </a:solidFill>
-                <a:latin typeface="Open Sans"/>
-                <a:ea typeface="Open Sans"/>
-                <a:cs typeface="Open Sans"/>
-                <a:sym typeface="Open Sans"/>
-              </a:rPr>
-              <a:t>groß</a:t>
-            </a:r>
-            <a:endParaRPr lang="en-US" sz="1200" dirty="0">
-              <a:solidFill>
-                <a:srgbClr val="FFFFFF"/>
-              </a:solidFill>
-              <a:latin typeface="Open Sans"/>
-              <a:ea typeface="Open Sans"/>
-              <a:cs typeface="Open Sans"/>
-              <a:sym typeface="Open Sans"/>
-            </a:endParaRPr>
-          </a:p>
-          <a:p>
-            <a:pPr marL="0" marR="0" lvl="0" indent="0" algn="l" rtl="0">
-              <a:spcBef>
-                <a:spcPts val="0"/>
-              </a:spcBef>
-              <a:spcAft>
-                <a:spcPts val="0"/>
-              </a:spcAft>
-              <a:buNone/>
-            </a:pPr>
-            <a:r>
-              <a:rPr lang="en-US" sz="1200" dirty="0" err="1">
-                <a:solidFill>
-                  <a:srgbClr val="FFFFFF"/>
-                </a:solidFill>
-                <a:latin typeface="Open Sans"/>
-                <a:ea typeface="Open Sans"/>
-                <a:cs typeface="Open Sans"/>
-                <a:sym typeface="Open Sans"/>
-              </a:rPr>
-              <a:t>Gefahr</a:t>
-            </a:r>
-            <a:r>
-              <a:rPr lang="en-US" sz="1200" dirty="0">
-                <a:solidFill>
-                  <a:srgbClr val="FFFFFF"/>
-                </a:solidFill>
-                <a:latin typeface="Open Sans"/>
-                <a:ea typeface="Open Sans"/>
-                <a:cs typeface="Open Sans"/>
-                <a:sym typeface="Open Sans"/>
-              </a:rPr>
-              <a:t>:  Zombieland Game</a:t>
+              <a:t>Risk:  Zombieland Game</a:t>
             </a:r>
             <a:endParaRPr sz="1200" dirty="0">
               <a:latin typeface="Open Sans"/>
@@ -12040,7 +12027,7 @@
               <a:buNone/>
             </a:pPr>
             <a:r>
-              <a:rPr lang="en-US" sz="1200" dirty="0" err="1">
+              <a:rPr lang="en-US" sz="1200" dirty="0">
                 <a:solidFill>
                   <a:srgbClr val="FFFFFF"/>
                 </a:solidFill>
@@ -12049,17 +12036,8 @@
                 <a:cs typeface="Open Sans"/>
                 <a:sym typeface="Open Sans"/>
               </a:rPr>
-              <a:t>Resourcenknappheit</a:t>
+              <a:t>Limited Resources</a:t>
             </a:r>
-            <a:endParaRPr lang="en-US" sz="1200" dirty="0">
-              <a:solidFill>
-                <a:srgbClr val="FFFFFF"/>
-              </a:solidFill>
-              <a:latin typeface="Open Sans"/>
-              <a:ea typeface="Open Sans"/>
-              <a:cs typeface="Open Sans"/>
-              <a:sym typeface="Open Sans"/>
-            </a:endParaRPr>
           </a:p>
           <a:p>
             <a:pPr marL="0" marR="0" lvl="0" indent="0" algn="l" rtl="0">
@@ -12171,7 +12149,7 @@
                 <a:cs typeface="Montserrat"/>
                 <a:sym typeface="Montserrat"/>
               </a:rPr>
-              <a:t>Kritiker</a:t>
+              <a:t>Critics</a:t>
             </a:r>
           </a:p>
           <a:p>
@@ -12187,18 +12165,6 @@
           </a:p>
           <a:p>
             <a:pPr lvl="0"/>
-            <a:r>
-              <a:rPr lang="en-US" dirty="0" err="1">
-                <a:solidFill>
-                  <a:schemeClr val="bg1"/>
-                </a:solidFill>
-                <a:latin typeface="Montserrat" panose="020B0604020202020204" charset="0"/>
-                <a:ea typeface="Open Sans"/>
-                <a:cs typeface="Open Sans"/>
-                <a:sym typeface="Open Sans"/>
-              </a:rPr>
-              <a:t>Fallbeispiel</a:t>
-            </a:r>
             <a:r>
               <a:rPr lang="en-US" dirty="0">
                 <a:solidFill>
@@ -12209,7 +12175,7 @@
                 <a:cs typeface="Open Sans"/>
                 <a:sym typeface="Open Sans"/>
               </a:rPr>
-              <a:t>: Flappy Bird</a:t>
+              <a:t>Example: Flappy Bird</a:t>
             </a:r>
           </a:p>
         </p:txBody>
@@ -12391,7 +12357,7 @@
             </a:pPr>
             <a:r>
               <a:rPr lang="de-DE" dirty="0"/>
-              <a:t>Fokus auf Gameplay nicht Features</a:t>
+              <a:t>Focus on Gameplay not Features</a:t>
             </a:r>
           </a:p>
           <a:p>
@@ -12418,7 +12384,7 @@
             </a:pPr>
             <a:r>
               <a:rPr lang="de-DE" dirty="0"/>
-              <a:t>Spezialisierung auf ein Gameplay</a:t>
+              <a:t>Recourceful Development &amp; small team</a:t>
             </a:r>
           </a:p>
           <a:p>
@@ -13265,28 +13231,8 @@
               <a:buNone/>
             </a:pPr>
             <a:r>
-              <a:rPr lang="en-US" dirty="0" err="1"/>
-              <a:t>Monatliche</a:t>
-            </a:r>
-            <a:r>
               <a:rPr lang="en-US" dirty="0"/>
-              <a:t> </a:t>
-            </a:r>
-            <a:r>
-              <a:rPr lang="en-US" dirty="0" err="1"/>
-              <a:t>Kosten</a:t>
-            </a:r>
-            <a:r>
-              <a:rPr lang="en-US" dirty="0"/>
-              <a:t> + (</a:t>
-            </a:r>
-            <a:r>
-              <a:rPr lang="en-US" dirty="0" err="1"/>
-              <a:t>Einmalige</a:t>
-            </a:r>
-            <a:r>
-              <a:rPr lang="en-US" dirty="0"/>
-              <a:t>)</a:t>
+              <a:t>Monthly costs (+ static costs)</a:t>
             </a:r>
             <a:endParaRPr dirty="0"/>
           </a:p>
@@ -13373,16 +13319,8 @@
               <a:buNone/>
             </a:pPr>
             <a:r>
-              <a:rPr lang="en-US" dirty="0" err="1"/>
-              <a:t>Monatlicher</a:t>
-            </a:r>
-            <a:r>
               <a:rPr lang="en-US" dirty="0"/>
-              <a:t> </a:t>
-            </a:r>
-            <a:r>
-              <a:rPr lang="en-US" dirty="0" err="1"/>
-              <a:t>Gewinn</a:t>
+              <a:t>Monthly profit</a:t>
             </a:r>
             <a:endParaRPr dirty="0"/>
           </a:p>
@@ -13481,16 +13419,8 @@
               <a:buNone/>
             </a:pPr>
             <a:r>
-              <a:rPr lang="en-US" dirty="0" err="1"/>
-              <a:t>Monatliche</a:t>
-            </a:r>
-            <a:r>
               <a:rPr lang="en-US" dirty="0"/>
-              <a:t> </a:t>
-            </a:r>
-            <a:r>
-              <a:rPr lang="en-US" dirty="0" err="1"/>
-              <a:t>Einnahmen</a:t>
+              <a:t>Monthly income</a:t>
             </a:r>
             <a:endParaRPr dirty="0"/>
           </a:p>
@@ -13693,7 +13623,7 @@
 </file>
 
 <file path=ppt/slides/slide22.xml><?xml version="1.0" encoding="utf-8"?>
-<p:sld xmlns:a="http://schemas.openxmlformats.org/drawingml/2006/main" xmlns:r="http://schemas.openxmlformats.org/officeDocument/2006/relationships" xmlns:p="http://schemas.openxmlformats.org/presentationml/2006/main">
+<p:sld xmlns:a="http://schemas.openxmlformats.org/drawingml/2006/main" xmlns:r="http://schemas.openxmlformats.org/officeDocument/2006/relationships" xmlns:p="http://schemas.openxmlformats.org/presentationml/2006/main" show="0">
   <p:cSld>
     <p:spTree>
       <p:nvGrpSpPr>
@@ -14517,6 +14447,36 @@
           </a:p>
         </p:txBody>
       </p:sp>
+      <p:pic>
+        <p:nvPicPr>
+          <p:cNvPr id="7" name="Picture 6" descr="A picture containing room, drawing&#10;&#10;Description automatically generated">
+            <a:extLst>
+              <a:ext uri="{FF2B5EF4-FFF2-40B4-BE49-F238E27FC236}">
+                <a16:creationId xmlns:a16="http://schemas.microsoft.com/office/drawing/2014/main" id="{C2AC2293-B9A2-4F66-89C8-D1411AF99B4B}"/>
+              </a:ext>
+            </a:extLst>
+          </p:cNvPr>
+          <p:cNvPicPr>
+            <a:picLocks noChangeAspect="1"/>
+          </p:cNvPicPr>
+          <p:nvPr/>
+        </p:nvPicPr>
+        <p:blipFill>
+          <a:blip r:embed="rId3"/>
+          <a:stretch>
+            <a:fillRect/>
+          </a:stretch>
+        </p:blipFill>
+        <p:spPr>
+          <a:xfrm>
+            <a:off x="6949975" y="1171444"/>
+            <a:ext cx="1219200" cy="1219200"/>
+          </a:xfrm>
+          <a:prstGeom prst="rect">
+            <a:avLst/>
+          </a:prstGeom>
+        </p:spPr>
+      </p:pic>
     </p:spTree>
     <p:extLst>
       <p:ext uri="{BB962C8B-B14F-4D97-AF65-F5344CB8AC3E}">
@@ -14534,7 +14494,7 @@
 </file>
 
 <file path=ppt/slides/slide3.xml><?xml version="1.0" encoding="utf-8"?>
-<p:sld xmlns:a="http://schemas.openxmlformats.org/drawingml/2006/main" xmlns:r="http://schemas.openxmlformats.org/officeDocument/2006/relationships" xmlns:p="http://schemas.openxmlformats.org/presentationml/2006/main">
+<p:sld xmlns:a="http://schemas.openxmlformats.org/drawingml/2006/main" xmlns:r="http://schemas.openxmlformats.org/officeDocument/2006/relationships" xmlns:p="http://schemas.openxmlformats.org/presentationml/2006/main" show="0">
   <p:cSld>
     <p:spTree>
       <p:nvGrpSpPr>
@@ -14679,7 +14639,7 @@
               <a:rPr lang="de-DE" sz="2400" dirty="0">
                 <a:latin typeface="Montserrat" panose="020B0604020202020204" charset="0"/>
               </a:rPr>
-              <a:t>Planung</a:t>
+              <a:t>Planning</a:t>
             </a:r>
           </a:p>
           <a:p>
@@ -14778,7 +14738,7 @@
 </file>
 
 <file path=ppt/slides/slide4.xml><?xml version="1.0" encoding="utf-8"?>
-<p:sld xmlns:a="http://schemas.openxmlformats.org/drawingml/2006/main" xmlns:r="http://schemas.openxmlformats.org/officeDocument/2006/relationships" xmlns:p="http://schemas.openxmlformats.org/presentationml/2006/main">
+<p:sld xmlns:a="http://schemas.openxmlformats.org/drawingml/2006/main" xmlns:r="http://schemas.openxmlformats.org/officeDocument/2006/relationships" xmlns:p="http://schemas.openxmlformats.org/presentationml/2006/main" show="0">
   <p:cSld>
     <p:spTree>
       <p:nvGrpSpPr>
@@ -15001,7 +14961,7 @@
             </a:pPr>
             <a:r>
               <a:rPr lang="de-DE" dirty="0"/>
-              <a:t>Was ist Giranimo?</a:t>
+              <a:t>What is Giranimo?</a:t>
             </a:r>
             <a:endParaRPr dirty="0"/>
           </a:p>
@@ -15104,7 +15064,7 @@
             </a:pPr>
             <a:r>
               <a:rPr lang="de-DE" sz="2400" dirty="0"/>
-              <a:t>Für IOS - Systeme</a:t>
+              <a:t>For IOS - Systeme</a:t>
             </a:r>
           </a:p>
           <a:p>
@@ -15399,7 +15359,7 @@
         <p:spPr>
           <a:xfrm>
             <a:off x="457199" y="785788"/>
-            <a:ext cx="4935071" cy="3971100"/>
+            <a:ext cx="4935071" cy="3858368"/>
           </a:xfrm>
           <a:prstGeom prst="rect">
             <a:avLst/>
@@ -15464,7 +15424,7 @@
                 <a:cs typeface="Montserrat"/>
                 <a:sym typeface="Montserrat"/>
               </a:rPr>
-              <a:t>Steuerung links &amp; rechts</a:t>
+              <a:t>Controlling left &amp; right</a:t>
             </a:r>
           </a:p>
           <a:p>
@@ -15501,7 +15461,7 @@
                 <a:cs typeface="Montserrat"/>
                 <a:sym typeface="Montserrat"/>
               </a:rPr>
-              <a:t>Nahrungsaufnahme damit der Hals wächst</a:t>
+              <a:t>Eat to grow</a:t>
             </a:r>
           </a:p>
           <a:p>
@@ -15538,7 +15498,7 @@
                 <a:cs typeface="Montserrat"/>
                 <a:sym typeface="Montserrat"/>
               </a:rPr>
-              <a:t>Ziel: So hoch wachsen wie möglich</a:t>
+              <a:t>Goal: To get as high as possible</a:t>
             </a:r>
           </a:p>
         </p:txBody>
@@ -16458,7 +16418,7 @@
             </a:pPr>
             <a:r>
               <a:rPr lang="de-DE" b="1" dirty="0"/>
-              <a:t>Nahrung</a:t>
+              <a:t>Food</a:t>
             </a:r>
             <a:endParaRPr b="1" dirty="0"/>
           </a:p>
@@ -16473,48 +16433,8 @@
               <a:buNone/>
             </a:pPr>
             <a:r>
-              <a:rPr lang="en-US" dirty="0" err="1"/>
-              <a:t>Objekte</a:t>
-            </a:r>
-            <a:r>
               <a:rPr lang="en-US" dirty="0"/>
-              <a:t>, die </a:t>
-            </a:r>
-            <a:r>
-              <a:rPr lang="en-US" dirty="0" err="1"/>
-              <a:t>beim</a:t>
-            </a:r>
-            <a:r>
-              <a:rPr lang="en-US" dirty="0"/>
-              <a:t> </a:t>
-            </a:r>
-            <a:r>
-              <a:rPr lang="en-US" dirty="0" err="1"/>
-              <a:t>Einsammeln</a:t>
-            </a:r>
-            <a:r>
-              <a:rPr lang="en-US" dirty="0"/>
-              <a:t> </a:t>
-            </a:r>
-            <a:r>
-              <a:rPr lang="en-US" dirty="0" err="1"/>
-              <a:t>ein</a:t>
-            </a:r>
-            <a:r>
-              <a:rPr lang="en-US" dirty="0"/>
-              <a:t> </a:t>
-            </a:r>
-            <a:r>
-              <a:rPr lang="en-US" dirty="0" err="1"/>
-              <a:t>Wachstumsschub</a:t>
-            </a:r>
-            <a:r>
-              <a:rPr lang="en-US" dirty="0"/>
-              <a:t> </a:t>
-            </a:r>
-            <a:r>
-              <a:rPr lang="en-US" dirty="0" err="1"/>
-              <a:t>auslösen</a:t>
+              <a:t>Objects, you eat to grow higher</a:t>
             </a:r>
             <a:endParaRPr dirty="0"/>
           </a:p>
@@ -16556,7 +16476,7 @@
             </a:pPr>
             <a:r>
               <a:rPr lang="de-DE" dirty="0"/>
-              <a:t>Spielemente</a:t>
+              <a:t>Game Elements</a:t>
             </a:r>
             <a:endParaRPr dirty="0"/>
           </a:p>
@@ -16598,7 +16518,7 @@
             </a:pPr>
             <a:r>
               <a:rPr lang="de-DE" b="1" dirty="0"/>
-              <a:t>Hindernis</a:t>
+              <a:t>Obstacle</a:t>
             </a:r>
           </a:p>
           <a:p>
@@ -16613,7 +16533,7 @@
             </a:pPr>
             <a:r>
               <a:rPr lang="de-DE" dirty="0"/>
-              <a:t>Objekte, die beim Berühren zum Game Over führen</a:t>
+              <a:t>If you touch them you lose the game</a:t>
             </a:r>
             <a:endParaRPr dirty="0"/>
           </a:p>
@@ -16904,7 +16824,7 @@
 </file>
 
 <file path=ppt/slides/slide9.xml><?xml version="1.0" encoding="utf-8"?>
-<p:sld xmlns:a="http://schemas.openxmlformats.org/drawingml/2006/main" xmlns:r="http://schemas.openxmlformats.org/officeDocument/2006/relationships" xmlns:p="http://schemas.openxmlformats.org/presentationml/2006/main">
+<p:sld xmlns:a="http://schemas.openxmlformats.org/drawingml/2006/main" xmlns:r="http://schemas.openxmlformats.org/officeDocument/2006/relationships" xmlns:p="http://schemas.openxmlformats.org/presentationml/2006/main" show="0">
   <p:cSld>
     <p:spTree>
       <p:nvGrpSpPr>

</xml_diff>

<commit_message>
Names into readme, notes for presentation
</commit_message>
<xml_diff>
--- a/Presentation/Pitch.pptx
+++ b/Presentation/Pitch.pptx
@@ -1650,7 +1650,122 @@
               <a:rPr lang="de-DE" dirty="0"/>
               <a:t>ZEITPLAN</a:t>
             </a:r>
-            <a:endParaRPr dirty="0"/>
+          </a:p>
+          <a:p>
+            <a:pPr marL="0" lvl="0" indent="0" algn="l" rtl="0">
+              <a:spcBef>
+                <a:spcPts val="0"/>
+              </a:spcBef>
+              <a:spcAft>
+                <a:spcPts val="0"/>
+              </a:spcAft>
+              <a:buNone/>
+            </a:pPr>
+            <a:r>
+              <a:rPr lang="de-DE" dirty="0"/>
+              <a:t>Befinden uns in </a:t>
+            </a:r>
+            <a:r>
+              <a:rPr lang="de-DE" dirty="0" err="1"/>
+              <a:t>Preproduction</a:t>
+            </a:r>
+            <a:r>
+              <a:rPr lang="de-DE" dirty="0"/>
+              <a:t> (Planung des Projekts)</a:t>
+            </a:r>
+          </a:p>
+          <a:p>
+            <a:pPr marL="0" lvl="0" indent="0" algn="l" rtl="0">
+              <a:spcBef>
+                <a:spcPts val="0"/>
+              </a:spcBef>
+              <a:spcAft>
+                <a:spcPts val="0"/>
+              </a:spcAft>
+              <a:buNone/>
+            </a:pPr>
+            <a:r>
+              <a:rPr lang="de-DE" dirty="0"/>
+              <a:t>Geplant in den nächsten 3 Monaten das Spiel zu erstellen und testen</a:t>
+            </a:r>
+          </a:p>
+          <a:p>
+            <a:pPr marL="0" marR="0" lvl="0" indent="0" algn="l" defTabSz="914400" rtl="0" eaLnBrk="1" fontAlgn="auto" latinLnBrk="0" hangingPunct="1">
+              <a:lnSpc>
+                <a:spcPct val="100000"/>
+              </a:lnSpc>
+              <a:spcBef>
+                <a:spcPts val="0"/>
+              </a:spcBef>
+              <a:spcAft>
+                <a:spcPts val="0"/>
+              </a:spcAft>
+              <a:buClr>
+                <a:srgbClr val="000000"/>
+              </a:buClr>
+              <a:buSzPts val="1400"/>
+              <a:buFont typeface="Arial"/>
+              <a:buNone/>
+              <a:tabLst/>
+              <a:defRPr/>
+            </a:pPr>
+            <a:r>
+              <a:rPr lang="de-DE" dirty="0"/>
+              <a:t>während </a:t>
+            </a:r>
+            <a:r>
+              <a:rPr lang="de-DE" dirty="0" err="1"/>
+              <a:t>Production</a:t>
+            </a:r>
+            <a:r>
+              <a:rPr lang="de-DE" dirty="0"/>
+              <a:t> Tester anwerben</a:t>
+            </a:r>
+          </a:p>
+          <a:p>
+            <a:pPr marL="0" lvl="0" indent="0" algn="l" rtl="0">
+              <a:spcBef>
+                <a:spcPts val="0"/>
+              </a:spcBef>
+              <a:spcAft>
+                <a:spcPts val="0"/>
+              </a:spcAft>
+              <a:buNone/>
+            </a:pPr>
+            <a:r>
+              <a:rPr lang="de-DE" dirty="0"/>
+              <a:t>Extra Testphase nach dem Erstellen, aber auch währenddessen immer wieder selber testen</a:t>
+            </a:r>
+          </a:p>
+          <a:p>
+            <a:pPr marL="0" lvl="0" indent="0" algn="l" rtl="0">
+              <a:spcBef>
+                <a:spcPts val="0"/>
+              </a:spcBef>
+              <a:spcAft>
+                <a:spcPts val="0"/>
+              </a:spcAft>
+              <a:buNone/>
+            </a:pPr>
+            <a:r>
+              <a:rPr lang="de-DE" dirty="0"/>
+              <a:t>Geplanter Release nach 3 Monaten intensiver Arbeit</a:t>
+            </a:r>
+          </a:p>
+          <a:p>
+            <a:pPr marL="0" lvl="0" indent="0" algn="l" rtl="0">
+              <a:spcBef>
+                <a:spcPts val="0"/>
+              </a:spcBef>
+              <a:spcAft>
+                <a:spcPts val="0"/>
+              </a:spcAft>
+              <a:buNone/>
+            </a:pPr>
+            <a:r>
+              <a:rPr lang="de-DE" dirty="0"/>
+              <a:t>Danach große Marketingphase: Zeitintensiv, Schneeballprinzip</a:t>
+            </a:r>
           </a:p>
         </p:txBody>
       </p:sp>
@@ -1759,6 +1874,178 @@
               </a:spcAft>
               <a:buNone/>
             </a:pPr>
+            <a:r>
+              <a:rPr lang="de-DE" dirty="0"/>
+              <a:t>Starke Konkurrenz:</a:t>
+            </a:r>
+          </a:p>
+          <a:p>
+            <a:pPr marL="0" lvl="0" indent="0" algn="l" rtl="0">
+              <a:spcBef>
+                <a:spcPts val="0"/>
+              </a:spcBef>
+              <a:spcAft>
+                <a:spcPts val="0"/>
+              </a:spcAft>
+              <a:buNone/>
+            </a:pPr>
+            <a:r>
+              <a:rPr lang="de-DE" dirty="0"/>
+              <a:t>Der Spielemarkt ist gigantisch! Sehr viele ähnliche Spiele. Dennoch viele erfolgreiche nicht ein ganz großes</a:t>
+            </a:r>
+          </a:p>
+          <a:p>
+            <a:pPr marL="0" lvl="0" indent="0" algn="l" rtl="0">
+              <a:spcBef>
+                <a:spcPts val="0"/>
+              </a:spcBef>
+              <a:spcAft>
+                <a:spcPts val="0"/>
+              </a:spcAft>
+              <a:buNone/>
+            </a:pPr>
+            <a:r>
+              <a:rPr lang="de-DE" dirty="0"/>
+              <a:t>Abwägung: in der Masse untergehen oder Herausstechen durch Charme und einzigartigem Humor</a:t>
+            </a:r>
+          </a:p>
+          <a:p>
+            <a:pPr marL="0" lvl="0" indent="0" algn="l" rtl="0">
+              <a:spcBef>
+                <a:spcPts val="0"/>
+              </a:spcBef>
+              <a:spcAft>
+                <a:spcPts val="0"/>
+              </a:spcAft>
+              <a:buNone/>
+            </a:pPr>
+            <a:endParaRPr lang="de-DE" dirty="0"/>
+          </a:p>
+          <a:p>
+            <a:pPr marL="0" lvl="0" indent="0" algn="l" rtl="0">
+              <a:spcBef>
+                <a:spcPts val="0"/>
+              </a:spcBef>
+              <a:spcAft>
+                <a:spcPts val="0"/>
+              </a:spcAft>
+              <a:buNone/>
+            </a:pPr>
+            <a:r>
+              <a:rPr lang="de-DE" dirty="0"/>
+              <a:t>Kritik:</a:t>
+            </a:r>
+          </a:p>
+          <a:p>
+            <a:pPr marL="0" lvl="0" indent="0" algn="l" rtl="0">
+              <a:spcBef>
+                <a:spcPts val="0"/>
+              </a:spcBef>
+              <a:spcAft>
+                <a:spcPts val="0"/>
+              </a:spcAft>
+              <a:buNone/>
+            </a:pPr>
+            <a:r>
+              <a:rPr lang="de-DE" dirty="0"/>
+              <a:t>Frage: ähnlicher Sucht- und Depressionsfaktor wie Flappy Bird? </a:t>
+            </a:r>
+          </a:p>
+          <a:p>
+            <a:pPr marL="0" lvl="0" indent="0" algn="l" rtl="0">
+              <a:spcBef>
+                <a:spcPts val="0"/>
+              </a:spcBef>
+              <a:spcAft>
+                <a:spcPts val="0"/>
+              </a:spcAft>
+              <a:buNone/>
+            </a:pPr>
+            <a:r>
+              <a:rPr lang="de-DE" dirty="0"/>
+              <a:t>Besonders beim Testen aufpassen, dass es gut </a:t>
+            </a:r>
+            <a:r>
+              <a:rPr lang="de-DE" dirty="0" err="1"/>
+              <a:t>gebalanced</a:t>
+            </a:r>
+            <a:r>
+              <a:rPr lang="de-DE" dirty="0"/>
+              <a:t> wird zwischen Spielspaß und Schwierigkeit</a:t>
+            </a:r>
+          </a:p>
+          <a:p>
+            <a:pPr marL="0" lvl="0" indent="0" algn="l" rtl="0">
+              <a:spcBef>
+                <a:spcPts val="0"/>
+              </a:spcBef>
+              <a:spcAft>
+                <a:spcPts val="0"/>
+              </a:spcAft>
+              <a:buNone/>
+            </a:pPr>
+            <a:endParaRPr lang="de-DE" dirty="0"/>
+          </a:p>
+          <a:p>
+            <a:pPr marL="0" lvl="0" indent="0" algn="l" rtl="0">
+              <a:spcBef>
+                <a:spcPts val="0"/>
+              </a:spcBef>
+              <a:spcAft>
+                <a:spcPts val="0"/>
+              </a:spcAft>
+              <a:buNone/>
+            </a:pPr>
+            <a:r>
+              <a:rPr lang="de-DE" dirty="0"/>
+              <a:t>Low Budget:</a:t>
+            </a:r>
+          </a:p>
+          <a:p>
+            <a:pPr marL="0" lvl="0" indent="0" algn="l" rtl="0">
+              <a:spcBef>
+                <a:spcPts val="0"/>
+              </a:spcBef>
+              <a:spcAft>
+                <a:spcPts val="0"/>
+              </a:spcAft>
+              <a:buNone/>
+            </a:pPr>
+            <a:r>
+              <a:rPr lang="de-DE" dirty="0"/>
+              <a:t>Wenig Geld und wenige Personen</a:t>
+            </a:r>
+          </a:p>
+          <a:p>
+            <a:pPr marL="0" lvl="0" indent="0" algn="l" rtl="0">
+              <a:spcBef>
+                <a:spcPts val="0"/>
+              </a:spcBef>
+              <a:spcAft>
+                <a:spcPts val="0"/>
+              </a:spcAft>
+              <a:buNone/>
+            </a:pPr>
+            <a:r>
+              <a:rPr lang="de-DE" dirty="0"/>
+              <a:t>Deswegen wird das Hauptmerk auf das Spielgefühl gesetzt nicht auf unzählige Features (welche Zeit- und </a:t>
+            </a:r>
+            <a:r>
+              <a:rPr lang="de-DE" dirty="0" err="1"/>
+              <a:t>Resourcenintensiv</a:t>
+            </a:r>
+            <a:r>
+              <a:rPr lang="de-DE" dirty="0"/>
+              <a:t> sind, </a:t>
+            </a:r>
+            <a:r>
+              <a:rPr lang="de-DE" dirty="0" err="1"/>
+              <a:t>zB</a:t>
+            </a:r>
+            <a:r>
+              <a:rPr lang="de-DE" dirty="0"/>
+              <a:t> Art)</a:t>
+            </a:r>
             <a:endParaRPr dirty="0"/>
           </a:p>
         </p:txBody>
@@ -1868,7 +2155,91 @@
               </a:spcAft>
               <a:buNone/>
             </a:pPr>
-            <a:endParaRPr/>
+            <a:r>
+              <a:rPr lang="de-DE" dirty="0"/>
+              <a:t>Wie gerade erwähnt: Geld nicht in Features investieren, sondern in Spielgefühl</a:t>
+            </a:r>
+          </a:p>
+          <a:p>
+            <a:pPr marL="0" lvl="0" indent="0" algn="l" rtl="0">
+              <a:spcBef>
+                <a:spcPts val="0"/>
+              </a:spcBef>
+              <a:spcAft>
+                <a:spcPts val="0"/>
+              </a:spcAft>
+              <a:buNone/>
+            </a:pPr>
+            <a:r>
+              <a:rPr lang="de-DE" dirty="0"/>
+              <a:t>-&gt; niedrige </a:t>
+            </a:r>
+            <a:r>
+              <a:rPr lang="de-DE" dirty="0" err="1"/>
+              <a:t>Resourcenkosten</a:t>
+            </a:r>
+            <a:endParaRPr lang="de-DE" dirty="0"/>
+          </a:p>
+          <a:p>
+            <a:pPr marL="0" lvl="0" indent="0" algn="l" rtl="0">
+              <a:spcBef>
+                <a:spcPts val="0"/>
+              </a:spcBef>
+              <a:spcAft>
+                <a:spcPts val="0"/>
+              </a:spcAft>
+              <a:buNone/>
+            </a:pPr>
+            <a:r>
+              <a:rPr lang="de-DE" dirty="0"/>
+              <a:t>Kleines Team kostet natürlich weniger als ein großes</a:t>
+            </a:r>
+          </a:p>
+          <a:p>
+            <a:pPr marL="0" lvl="0" indent="0" algn="l" rtl="0">
+              <a:spcBef>
+                <a:spcPts val="0"/>
+              </a:spcBef>
+              <a:spcAft>
+                <a:spcPts val="0"/>
+              </a:spcAft>
+              <a:buNone/>
+            </a:pPr>
+            <a:r>
+              <a:rPr lang="de-DE" dirty="0"/>
+              <a:t>Kosten steigen langsam an während der Phasen 1-4 und am Ende wird das meiste Geld in Marketing gesteckt (rasanter Anstieg)</a:t>
+            </a:r>
+          </a:p>
+          <a:p>
+            <a:pPr marL="0" lvl="0" indent="0" algn="l" rtl="0">
+              <a:spcBef>
+                <a:spcPts val="0"/>
+              </a:spcBef>
+              <a:spcAft>
+                <a:spcPts val="0"/>
+              </a:spcAft>
+              <a:buNone/>
+            </a:pPr>
+            <a:r>
+              <a:rPr lang="de-DE" dirty="0"/>
+              <a:t>Einkommen natürlich erst nach Release</a:t>
+            </a:r>
+          </a:p>
+          <a:p>
+            <a:pPr marL="0" lvl="0" indent="0" algn="l" rtl="0">
+              <a:spcBef>
+                <a:spcPts val="0"/>
+              </a:spcBef>
+              <a:spcAft>
+                <a:spcPts val="0"/>
+              </a:spcAft>
+              <a:buNone/>
+            </a:pPr>
+            <a:r>
+              <a:rPr lang="de-DE" dirty="0"/>
+              <a:t>Wenn Marketing erfolgreich: exponentieller Anstieg und baldiger Break-Even, (Ausgaben gedeckt)</a:t>
+            </a:r>
+            <a:endParaRPr dirty="0"/>
           </a:p>
         </p:txBody>
       </p:sp>
@@ -2000,6 +2371,146 @@
 </file>
 
 <file path=ppt/notesSlides/notesSlide20.xml><?xml version="1.0" encoding="utf-8"?>
+<p:notes xmlns:a="http://schemas.openxmlformats.org/drawingml/2006/main" xmlns:r="http://schemas.openxmlformats.org/officeDocument/2006/relationships" xmlns:p="http://schemas.openxmlformats.org/presentationml/2006/main">
+  <p:cSld>
+    <p:spTree>
+      <p:nvGrpSpPr>
+        <p:cNvPr id="1" name=""/>
+        <p:cNvGrpSpPr/>
+        <p:nvPr/>
+      </p:nvGrpSpPr>
+      <p:grpSpPr>
+        <a:xfrm>
+          <a:off x="0" y="0"/>
+          <a:ext cx="0" cy="0"/>
+          <a:chOff x="0" y="0"/>
+          <a:chExt cx="0" cy="0"/>
+        </a:xfrm>
+      </p:grpSpPr>
+      <p:sp>
+        <p:nvSpPr>
+          <p:cNvPr id="2" name="Folienbildplatzhalter 1"/>
+          <p:cNvSpPr>
+            <a:spLocks noGrp="1" noRot="1" noChangeAspect="1"/>
+          </p:cNvSpPr>
+          <p:nvPr>
+            <p:ph type="sldImg"/>
+          </p:nvPr>
+        </p:nvSpPr>
+        <p:spPr>
+          <a:xfrm>
+            <a:off x="381000" y="685800"/>
+            <a:ext cx="6096000" cy="3429000"/>
+          </a:xfrm>
+        </p:spPr>
+      </p:sp>
+      <p:sp>
+        <p:nvSpPr>
+          <p:cNvPr id="3" name="Notizenplatzhalter 2"/>
+          <p:cNvSpPr>
+            <a:spLocks noGrp="1"/>
+          </p:cNvSpPr>
+          <p:nvPr>
+            <p:ph type="body" idx="1"/>
+          </p:nvPr>
+        </p:nvSpPr>
+        <p:spPr/>
+        <p:txBody>
+          <a:bodyPr/>
+          <a:lstStyle/>
+          <a:p>
+            <a:pPr marL="139700" indent="0">
+              <a:buNone/>
+            </a:pPr>
+            <a:r>
+              <a:rPr lang="de-DE" dirty="0"/>
+              <a:t>Monetarisierung</a:t>
+            </a:r>
+          </a:p>
+          <a:p>
+            <a:pPr marL="139700" indent="0">
+              <a:buNone/>
+            </a:pPr>
+            <a:r>
+              <a:rPr lang="de-DE" dirty="0"/>
+              <a:t>Vorneweg nehmen: kein </a:t>
+            </a:r>
+            <a:r>
+              <a:rPr lang="de-DE" dirty="0" err="1"/>
+              <a:t>pay-to-win</a:t>
+            </a:r>
+            <a:r>
+              <a:rPr lang="de-DE" dirty="0"/>
+              <a:t>!!! Schreckt viele ab</a:t>
+            </a:r>
+          </a:p>
+          <a:p>
+            <a:pPr marL="139700" indent="0">
+              <a:buNone/>
+            </a:pPr>
+            <a:r>
+              <a:rPr lang="de-DE" dirty="0"/>
+              <a:t>Deswegen: </a:t>
+            </a:r>
+            <a:r>
+              <a:rPr lang="de-DE" dirty="0" err="1"/>
+              <a:t>ca</a:t>
+            </a:r>
+            <a:r>
+              <a:rPr lang="de-DE" dirty="0"/>
+              <a:t> 1/3 der geplanten Einnahmen nur optionale optische Upgrades, </a:t>
+            </a:r>
+            <a:r>
+              <a:rPr lang="de-DE" dirty="0" err="1"/>
+              <a:t>zB</a:t>
+            </a:r>
+            <a:r>
+              <a:rPr lang="de-DE" dirty="0"/>
+              <a:t> Skins, Hintergründe</a:t>
+            </a:r>
+          </a:p>
+          <a:p>
+            <a:pPr marL="139700" indent="0">
+              <a:buNone/>
+            </a:pPr>
+            <a:r>
+              <a:rPr lang="de-DE" dirty="0"/>
+              <a:t>Die meisten Mobile Games setzen auf </a:t>
+            </a:r>
+            <a:r>
+              <a:rPr lang="de-DE" dirty="0" err="1"/>
+              <a:t>inapp</a:t>
+            </a:r>
+            <a:r>
+              <a:rPr lang="de-DE" dirty="0"/>
+              <a:t> Werbung</a:t>
+            </a:r>
+          </a:p>
+          <a:p>
+            <a:pPr marL="139700" indent="0">
+              <a:buNone/>
+            </a:pPr>
+            <a:r>
+              <a:rPr lang="de-DE" dirty="0"/>
+              <a:t>2/3 der Einnahmen bei uns: zusätzlich zum langsamen selbständigen Aufladen von Spielversuchen kann man Werbungen anschauen um seine Versuche wieder aufzuladen</a:t>
+            </a:r>
+          </a:p>
+        </p:txBody>
+      </p:sp>
+    </p:spTree>
+    <p:extLst>
+      <p:ext uri="{BB962C8B-B14F-4D97-AF65-F5344CB8AC3E}">
+        <p14:creationId xmlns:p14="http://schemas.microsoft.com/office/powerpoint/2010/main" val="2928533218"/>
+      </p:ext>
+    </p:extLst>
+  </p:cSld>
+  <p:clrMapOvr>
+    <a:masterClrMapping/>
+  </p:clrMapOvr>
+</p:notes>
+</file>
+
+<file path=ppt/notesSlides/notesSlide21.xml><?xml version="1.0" encoding="utf-8"?>
 <p:notes xmlns:a="http://schemas.openxmlformats.org/drawingml/2006/main" xmlns:r="http://schemas.openxmlformats.org/officeDocument/2006/relationships" xmlns:p="http://schemas.openxmlformats.org/presentationml/2006/main" showMasterSp="0" showMasterPhAnim="0">
   <p:cSld>
     <p:spTree>
@@ -2093,6 +2604,21 @@
             </a:pPr>
             <a:r>
               <a:rPr lang="de-DE" dirty="0"/>
+              <a:t>Unsere Grobe Ko</a:t>
+            </a:r>
+          </a:p>
+          <a:p>
+            <a:pPr marL="0" lvl="0" indent="0" algn="l" rtl="0">
+              <a:spcBef>
+                <a:spcPts val="0"/>
+              </a:spcBef>
+              <a:spcAft>
+                <a:spcPts val="0"/>
+              </a:spcAft>
+              <a:buNone/>
+            </a:pPr>
+            <a:r>
+              <a:rPr lang="de-DE" dirty="0"/>
               <a:t>Einmalige Kosten: Apple Development Lizensen, Trailer, Art</a:t>
             </a:r>
           </a:p>
@@ -2108,22 +2634,35 @@
             </a:pPr>
             <a:r>
               <a:rPr lang="de-DE" dirty="0"/>
-              <a:t>Monatliche Kosten: Persönliche Ausgaben, Werbungen + Puffer</a:t>
+              <a:t>Monatliche Kosten: Persönliche Ausgaben,  Marketing mit Werbung und </a:t>
             </a:r>
-          </a:p>
-          <a:p>
-            <a:pPr marL="0" lvl="0" indent="0" algn="l" rtl="0">
-              <a:spcBef>
-                <a:spcPts val="0"/>
-              </a:spcBef>
-              <a:spcAft>
-                <a:spcPts val="0"/>
-              </a:spcAft>
-              <a:buNone/>
-            </a:pPr>
+            <a:r>
+              <a:rPr lang="de-DE" dirty="0" err="1"/>
+              <a:t>Social</a:t>
+            </a:r>
             <a:r>
               <a:rPr lang="de-DE" dirty="0"/>
-              <a:t>Monatliche Einnahmen: Durch das Spiel</a:t>
+              <a:t> Media </a:t>
+            </a:r>
+            <a:r>
+              <a:rPr lang="de-DE"/>
+              <a:t>Management, Puffer</a:t>
+            </a:r>
+            <a:endParaRPr lang="de-DE" dirty="0"/>
+          </a:p>
+          <a:p>
+            <a:pPr marL="0" lvl="0" indent="0" algn="l" rtl="0">
+              <a:spcBef>
+                <a:spcPts val="0"/>
+              </a:spcBef>
+              <a:spcAft>
+                <a:spcPts val="0"/>
+              </a:spcAft>
+              <a:buNone/>
+            </a:pPr>
+            <a:r>
+              <a:rPr lang="de-DE" dirty="0"/>
+              <a:t>Monatliche Einnahmen: Durch das Spiel (Folie davor)</a:t>
             </a:r>
           </a:p>
         </p:txBody>
@@ -2141,7 +2680,7 @@
 </p:notes>
 </file>
 
-<file path=ppt/notesSlides/notesSlide21.xml><?xml version="1.0" encoding="utf-8"?>
+<file path=ppt/notesSlides/notesSlide22.xml><?xml version="1.0" encoding="utf-8"?>
 <p:notes xmlns:a="http://schemas.openxmlformats.org/drawingml/2006/main" xmlns:r="http://schemas.openxmlformats.org/officeDocument/2006/relationships" xmlns:p="http://schemas.openxmlformats.org/presentationml/2006/main" showMasterSp="0" showMasterPhAnim="0">
   <p:cSld>
     <p:spTree>
@@ -2250,7 +2789,7 @@
 </p:notes>
 </file>
 
-<file path=ppt/notesSlides/notesSlide22.xml><?xml version="1.0" encoding="utf-8"?>
+<file path=ppt/notesSlides/notesSlide23.xml><?xml version="1.0" encoding="utf-8"?>
 <p:notes xmlns:a="http://schemas.openxmlformats.org/drawingml/2006/main" xmlns:r="http://schemas.openxmlformats.org/officeDocument/2006/relationships" xmlns:p="http://schemas.openxmlformats.org/presentationml/2006/main" showMasterSp="0" showMasterPhAnim="0">
   <p:cSld>
     <p:spTree>
@@ -2359,7 +2898,7 @@
 </p:notes>
 </file>
 
-<file path=ppt/notesSlides/notesSlide23.xml><?xml version="1.0" encoding="utf-8"?>
+<file path=ppt/notesSlides/notesSlide24.xml><?xml version="1.0" encoding="utf-8"?>
 <p:notes xmlns:a="http://schemas.openxmlformats.org/drawingml/2006/main" xmlns:r="http://schemas.openxmlformats.org/officeDocument/2006/relationships" xmlns:p="http://schemas.openxmlformats.org/presentationml/2006/main" showMasterSp="0" showMasterPhAnim="0">
   <p:cSld>
     <p:spTree>
@@ -3732,7 +4271,7 @@
             </a:pPr>
             <a:fld id="{00000000-1234-1234-1234-123412341234}" type="slidenum">
               <a:rPr lang="en"/>
-              <a:t>‹#›</a:t>
+              <a:t>‹Nr.›</a:t>
             </a:fld>
             <a:endParaRPr/>
           </a:p>
@@ -3925,7 +4464,7 @@
             </a:pPr>
             <a:fld id="{00000000-1234-1234-1234-123412341234}" type="slidenum">
               <a:rPr lang="en"/>
-              <a:t>‹#›</a:t>
+              <a:t>‹Nr.›</a:t>
             </a:fld>
             <a:endParaRPr/>
           </a:p>
@@ -4037,7 +4576,7 @@
             </a:pPr>
             <a:fld id="{00000000-1234-1234-1234-123412341234}" type="slidenum">
               <a:rPr lang="en"/>
-              <a:t>‹#›</a:t>
+              <a:t>‹Nr.›</a:t>
             </a:fld>
             <a:endParaRPr/>
           </a:p>
@@ -4493,7 +5032,7 @@
             </a:pPr>
             <a:fld id="{00000000-1234-1234-1234-123412341234}" type="slidenum">
               <a:rPr lang="en"/>
-              <a:t>‹#›</a:t>
+              <a:t>‹Nr.›</a:t>
             </a:fld>
             <a:endParaRPr/>
           </a:p>
@@ -4957,7 +5496,7 @@
             </a:pPr>
             <a:fld id="{00000000-1234-1234-1234-123412341234}" type="slidenum">
               <a:rPr lang="en"/>
-              <a:t>‹#›</a:t>
+              <a:t>‹Nr.›</a:t>
             </a:fld>
             <a:endParaRPr/>
           </a:p>
@@ -5328,7 +5867,7 @@
             </a:pPr>
             <a:fld id="{00000000-1234-1234-1234-123412341234}" type="slidenum">
               <a:rPr lang="en"/>
-              <a:t>‹#›</a:t>
+              <a:t>‹Nr.›</a:t>
             </a:fld>
             <a:endParaRPr/>
           </a:p>
@@ -5707,7 +6246,7 @@
             </a:pPr>
             <a:fld id="{00000000-1234-1234-1234-123412341234}" type="slidenum">
               <a:rPr lang="en"/>
-              <a:t>‹#›</a:t>
+              <a:t>‹Nr.›</a:t>
             </a:fld>
             <a:endParaRPr/>
           </a:p>
@@ -6109,7 +6648,7 @@
             </a:pPr>
             <a:fld id="{00000000-1234-1234-1234-123412341234}" type="slidenum">
               <a:rPr lang="en"/>
-              <a:t>‹#›</a:t>
+              <a:t>‹Nr.›</a:t>
             </a:fld>
             <a:endParaRPr/>
           </a:p>
@@ -6694,7 +7233,7 @@
             </a:pPr>
             <a:fld id="{00000000-1234-1234-1234-123412341234}" type="slidenum">
               <a:rPr lang="en"/>
-              <a:t>‹#›</a:t>
+              <a:t>‹Nr.›</a:t>
             </a:fld>
             <a:endParaRPr/>
           </a:p>
@@ -6967,7 +7506,7 @@
             </a:pPr>
             <a:fld id="{00000000-1234-1234-1234-123412341234}" type="slidenum">
               <a:rPr lang="en"/>
-              <a:t>‹#›</a:t>
+              <a:t>‹Nr.›</a:t>
             </a:fld>
             <a:endParaRPr/>
           </a:p>
@@ -7071,7 +7610,7 @@
             </a:pPr>
             <a:fld id="{00000000-1234-1234-1234-123412341234}" type="slidenum">
               <a:rPr lang="en"/>
-              <a:t>‹#›</a:t>
+              <a:t>‹Nr.›</a:t>
             </a:fld>
             <a:endParaRPr/>
           </a:p>
@@ -7741,7 +8280,7 @@
             </a:pPr>
             <a:fld id="{00000000-1234-1234-1234-123412341234}" type="slidenum">
               <a:rPr lang="en"/>
-              <a:t>‹#›</a:t>
+              <a:t>‹Nr.›</a:t>
             </a:fld>
             <a:endParaRPr/>
           </a:p>
@@ -12995,7 +13534,7 @@
           <p:nvPr/>
         </p:nvPicPr>
         <p:blipFill>
-          <a:blip r:embed="rId2"/>
+          <a:blip r:embed="rId3"/>
           <a:stretch>
             <a:fillRect/>
           </a:stretch>
@@ -13038,7 +13577,7 @@
           <p:nvPr/>
         </p:nvPicPr>
         <p:blipFill>
-          <a:blip r:embed="rId3">
+          <a:blip r:embed="rId4">
             <a:extLst>
               <a:ext uri="{28A0092B-C50C-407E-A947-70E740481C1C}">
                 <a14:useLocalDpi xmlns:a14="http://schemas.microsoft.com/office/drawing/2010/main" val="0"/>

</xml_diff>